<commit_message>
Update Cloud_Computing Project Mid-Progress.pptx
</commit_message>
<xml_diff>
--- a/Presentations/Cloud_Computing Project Mid-Progress.pptx
+++ b/Presentations/Cloud_Computing Project Mid-Progress.pptx
@@ -6,7 +6,7 @@
     <p:sldMasterId id="2147483660" r:id="rId2"/>
   </p:sldMasterIdLst>
   <p:notesMasterIdLst>
-    <p:notesMasterId r:id="rId19"/>
+    <p:notesMasterId r:id="rId17"/>
   </p:notesMasterIdLst>
   <p:sldIdLst>
     <p:sldId id="257" r:id="rId3"/>
@@ -19,12 +19,10 @@
     <p:sldId id="264" r:id="rId10"/>
     <p:sldId id="272" r:id="rId11"/>
     <p:sldId id="267" r:id="rId12"/>
-    <p:sldId id="278" r:id="rId13"/>
+    <p:sldId id="268" r:id="rId13"/>
     <p:sldId id="269" r:id="rId14"/>
-    <p:sldId id="276" r:id="rId15"/>
-    <p:sldId id="275" r:id="rId16"/>
-    <p:sldId id="277" r:id="rId17"/>
-    <p:sldId id="262" r:id="rId18"/>
+    <p:sldId id="270" r:id="rId15"/>
+    <p:sldId id="262" r:id="rId16"/>
   </p:sldIdLst>
   <p:sldSz cx="9144000" cy="6858000" type="screen4x3"/>
   <p:notesSz cx="6858000" cy="9144000"/>
@@ -236,7 +234,7 @@
           <a:p>
             <a:fld id="{6A408A42-8110-7F4B-8B5D-8E63E83FB20C}" type="datetimeFigureOut">
               <a:rPr lang="en-US" smtClean="0"/>
-              <a:t>12/5/2019</a:t>
+              <a:t>10/26/2019</a:t>
             </a:fld>
             <a:endParaRPr lang="en-US"/>
           </a:p>
@@ -820,7 +818,7 @@
           <a:p>
             <a:fld id="{4989D2A8-80AF-A04A-8712-B8C3DD67BF6B}" type="slidenum">
               <a:rPr lang="en-US" smtClean="0"/>
-              <a:t>16</a:t>
+              <a:t>14</a:t>
             </a:fld>
             <a:endParaRPr lang="en-US"/>
           </a:p>
@@ -1018,7 +1016,7 @@
           <a:p>
             <a:fld id="{49DBEA4D-F3C4-4046-BB47-FCB1207B26B3}" type="datetimeFigureOut">
               <a:rPr lang="en-US" smtClean="0"/>
-              <a:t>12/5/2019</a:t>
+              <a:t>10/26/2019</a:t>
             </a:fld>
             <a:endParaRPr lang="en-US"/>
           </a:p>
@@ -1186,7 +1184,7 @@
           <a:p>
             <a:fld id="{49DBEA4D-F3C4-4046-BB47-FCB1207B26B3}" type="datetimeFigureOut">
               <a:rPr lang="en-US" smtClean="0"/>
-              <a:t>12/5/2019</a:t>
+              <a:t>10/26/2019</a:t>
             </a:fld>
             <a:endParaRPr lang="en-US"/>
           </a:p>
@@ -1364,7 +1362,7 @@
           <a:p>
             <a:fld id="{49DBEA4D-F3C4-4046-BB47-FCB1207B26B3}" type="datetimeFigureOut">
               <a:rPr lang="en-US" smtClean="0"/>
-              <a:t>12/5/2019</a:t>
+              <a:t>10/26/2019</a:t>
             </a:fld>
             <a:endParaRPr lang="en-US"/>
           </a:p>
@@ -1614,7 +1612,7 @@
           <a:p>
             <a:fld id="{CB151F00-3264-D74A-9603-89B73FD0711A}" type="datetimeFigureOut">
               <a:rPr lang="en-US" smtClean="0"/>
-              <a:t>12/5/2019</a:t>
+              <a:t>10/26/2019</a:t>
             </a:fld>
             <a:endParaRPr lang="en-US"/>
           </a:p>
@@ -1782,7 +1780,7 @@
           <a:p>
             <a:fld id="{CB151F00-3264-D74A-9603-89B73FD0711A}" type="datetimeFigureOut">
               <a:rPr lang="en-US" smtClean="0"/>
-              <a:t>12/5/2019</a:t>
+              <a:t>10/26/2019</a:t>
             </a:fld>
             <a:endParaRPr lang="en-US"/>
           </a:p>
@@ -2027,7 +2025,7 @@
           <a:p>
             <a:fld id="{CB151F00-3264-D74A-9603-89B73FD0711A}" type="datetimeFigureOut">
               <a:rPr lang="en-US" smtClean="0"/>
-              <a:t>12/5/2019</a:t>
+              <a:t>10/26/2019</a:t>
             </a:fld>
             <a:endParaRPr lang="en-US"/>
           </a:p>
@@ -2312,7 +2310,7 @@
           <a:p>
             <a:fld id="{CB151F00-3264-D74A-9603-89B73FD0711A}" type="datetimeFigureOut">
               <a:rPr lang="en-US" smtClean="0"/>
-              <a:t>12/5/2019</a:t>
+              <a:t>10/26/2019</a:t>
             </a:fld>
             <a:endParaRPr lang="en-US"/>
           </a:p>
@@ -2731,7 +2729,7 @@
           <a:p>
             <a:fld id="{CB151F00-3264-D74A-9603-89B73FD0711A}" type="datetimeFigureOut">
               <a:rPr lang="en-US" smtClean="0"/>
-              <a:t>12/5/2019</a:t>
+              <a:t>10/26/2019</a:t>
             </a:fld>
             <a:endParaRPr lang="en-US"/>
           </a:p>
@@ -2848,7 +2846,7 @@
           <a:p>
             <a:fld id="{CB151F00-3264-D74A-9603-89B73FD0711A}" type="datetimeFigureOut">
               <a:rPr lang="en-US" smtClean="0"/>
-              <a:t>12/5/2019</a:t>
+              <a:t>10/26/2019</a:t>
             </a:fld>
             <a:endParaRPr lang="en-US"/>
           </a:p>
@@ -2943,7 +2941,7 @@
           <a:p>
             <a:fld id="{CB151F00-3264-D74A-9603-89B73FD0711A}" type="datetimeFigureOut">
               <a:rPr lang="en-US" smtClean="0"/>
-              <a:t>12/5/2019</a:t>
+              <a:t>10/26/2019</a:t>
             </a:fld>
             <a:endParaRPr lang="en-US"/>
           </a:p>
@@ -3218,7 +3216,7 @@
           <a:p>
             <a:fld id="{CB151F00-3264-D74A-9603-89B73FD0711A}" type="datetimeFigureOut">
               <a:rPr lang="en-US" smtClean="0"/>
-              <a:t>12/5/2019</a:t>
+              <a:t>10/26/2019</a:t>
             </a:fld>
             <a:endParaRPr lang="en-US"/>
           </a:p>
@@ -3386,7 +3384,7 @@
           <a:p>
             <a:fld id="{49DBEA4D-F3C4-4046-BB47-FCB1207B26B3}" type="datetimeFigureOut">
               <a:rPr lang="en-US" smtClean="0"/>
-              <a:t>12/5/2019</a:t>
+              <a:t>10/26/2019</a:t>
             </a:fld>
             <a:endParaRPr lang="en-US"/>
           </a:p>
@@ -3638,7 +3636,7 @@
           <a:p>
             <a:fld id="{CB151F00-3264-D74A-9603-89B73FD0711A}" type="datetimeFigureOut">
               <a:rPr lang="en-US" smtClean="0"/>
-              <a:t>12/5/2019</a:t>
+              <a:t>10/26/2019</a:t>
             </a:fld>
             <a:endParaRPr lang="en-US"/>
           </a:p>
@@ -3806,7 +3804,7 @@
           <a:p>
             <a:fld id="{CB151F00-3264-D74A-9603-89B73FD0711A}" type="datetimeFigureOut">
               <a:rPr lang="en-US" smtClean="0"/>
-              <a:t>12/5/2019</a:t>
+              <a:t>10/26/2019</a:t>
             </a:fld>
             <a:endParaRPr lang="en-US"/>
           </a:p>
@@ -3984,7 +3982,7 @@
           <a:p>
             <a:fld id="{CB151F00-3264-D74A-9603-89B73FD0711A}" type="datetimeFigureOut">
               <a:rPr lang="en-US" smtClean="0"/>
-              <a:t>12/5/2019</a:t>
+              <a:t>10/26/2019</a:t>
             </a:fld>
             <a:endParaRPr lang="en-US"/>
           </a:p>
@@ -4229,7 +4227,7 @@
           <a:p>
             <a:fld id="{49DBEA4D-F3C4-4046-BB47-FCB1207B26B3}" type="datetimeFigureOut">
               <a:rPr lang="en-US" smtClean="0"/>
-              <a:t>12/5/2019</a:t>
+              <a:t>10/26/2019</a:t>
             </a:fld>
             <a:endParaRPr lang="en-US"/>
           </a:p>
@@ -4514,7 +4512,7 @@
           <a:p>
             <a:fld id="{49DBEA4D-F3C4-4046-BB47-FCB1207B26B3}" type="datetimeFigureOut">
               <a:rPr lang="en-US" smtClean="0"/>
-              <a:t>12/5/2019</a:t>
+              <a:t>10/26/2019</a:t>
             </a:fld>
             <a:endParaRPr lang="en-US"/>
           </a:p>
@@ -4933,7 +4931,7 @@
           <a:p>
             <a:fld id="{49DBEA4D-F3C4-4046-BB47-FCB1207B26B3}" type="datetimeFigureOut">
               <a:rPr lang="en-US" smtClean="0"/>
-              <a:t>12/5/2019</a:t>
+              <a:t>10/26/2019</a:t>
             </a:fld>
             <a:endParaRPr lang="en-US"/>
           </a:p>
@@ -5050,7 +5048,7 @@
           <a:p>
             <a:fld id="{49DBEA4D-F3C4-4046-BB47-FCB1207B26B3}" type="datetimeFigureOut">
               <a:rPr lang="en-US" smtClean="0"/>
-              <a:t>12/5/2019</a:t>
+              <a:t>10/26/2019</a:t>
             </a:fld>
             <a:endParaRPr lang="en-US"/>
           </a:p>
@@ -5145,7 +5143,7 @@
           <a:p>
             <a:fld id="{49DBEA4D-F3C4-4046-BB47-FCB1207B26B3}" type="datetimeFigureOut">
               <a:rPr lang="en-US" smtClean="0"/>
-              <a:t>12/5/2019</a:t>
+              <a:t>10/26/2019</a:t>
             </a:fld>
             <a:endParaRPr lang="en-US"/>
           </a:p>
@@ -5420,7 +5418,7 @@
           <a:p>
             <a:fld id="{49DBEA4D-F3C4-4046-BB47-FCB1207B26B3}" type="datetimeFigureOut">
               <a:rPr lang="en-US" smtClean="0"/>
-              <a:t>12/5/2019</a:t>
+              <a:t>10/26/2019</a:t>
             </a:fld>
             <a:endParaRPr lang="en-US"/>
           </a:p>
@@ -5672,7 +5670,7 @@
           <a:p>
             <a:fld id="{49DBEA4D-F3C4-4046-BB47-FCB1207B26B3}" type="datetimeFigureOut">
               <a:rPr lang="en-US" smtClean="0"/>
-              <a:t>12/5/2019</a:t>
+              <a:t>10/26/2019</a:t>
             </a:fld>
             <a:endParaRPr lang="en-US"/>
           </a:p>
@@ -5889,7 +5887,7 @@
           <a:p>
             <a:fld id="{49DBEA4D-F3C4-4046-BB47-FCB1207B26B3}" type="datetimeFigureOut">
               <a:rPr lang="en-US" smtClean="0"/>
-              <a:t>12/5/2019</a:t>
+              <a:t>10/26/2019</a:t>
             </a:fld>
             <a:endParaRPr lang="en-US"/>
           </a:p>
@@ -6403,7 +6401,7 @@
           <a:p>
             <a:fld id="{CB151F00-3264-D74A-9603-89B73FD0711A}" type="datetimeFigureOut">
               <a:rPr lang="en-US" smtClean="0"/>
-              <a:t>12/5/2019</a:t>
+              <a:t>10/26/2019</a:t>
             </a:fld>
             <a:endParaRPr lang="en-US"/>
           </a:p>
@@ -6910,17 +6908,17 @@
                   <a:schemeClr val="accent1"/>
                 </a:solidFill>
               </a:rPr>
-              <a:t>Code Snippet - MongoDB </a:t>
+              <a:t>Home</a:t>
             </a:r>
           </a:p>
         </p:txBody>
       </p:sp>
       <p:pic>
         <p:nvPicPr>
-          <p:cNvPr id="6" name="Content Placeholder 5" descr="A screenshot of a social media post&#10;&#10;Description automatically generated">
+          <p:cNvPr id="9" name="Content Placeholder 8" descr="A picture containing light, computer&#10;&#10;Description automatically generated">
             <a:extLst>
               <a:ext uri="{FF2B5EF4-FFF2-40B4-BE49-F238E27FC236}">
-                <a16:creationId xmlns:a16="http://schemas.microsoft.com/office/drawing/2014/main" id="{14EE9ABE-B649-417E-AC22-39834A427F91}"/>
+                <a16:creationId xmlns:a16="http://schemas.microsoft.com/office/drawing/2014/main" id="{0C73667C-D248-4F48-B0AC-AD849D4D2CA8}"/>
               </a:ext>
             </a:extLst>
           </p:cNvPr>
@@ -6939,8 +6937,8 @@
         </p:blipFill>
         <p:spPr bwMode="auto">
           <a:xfrm>
-            <a:off x="457200" y="1335641"/>
-            <a:ext cx="8229600" cy="4294597"/>
+            <a:off x="457200" y="1613044"/>
+            <a:ext cx="8229600" cy="3965823"/>
           </a:xfrm>
           <a:prstGeom prst="rect">
             <a:avLst/>
@@ -6992,7 +6990,7 @@
           <p:cNvPr id="2" name="Title 1">
             <a:extLst>
               <a:ext uri="{FF2B5EF4-FFF2-40B4-BE49-F238E27FC236}">
-                <a16:creationId xmlns:a16="http://schemas.microsoft.com/office/drawing/2014/main" id="{B651F3FB-B2E2-47C9-8EEE-EAA6EC67694D}"/>
+                <a16:creationId xmlns:a16="http://schemas.microsoft.com/office/drawing/2014/main" id="{9DEF505A-5EAD-4EDA-BF32-ADEA5E62E94A}"/>
               </a:ext>
             </a:extLst>
           </p:cNvPr>
@@ -7014,7 +7012,7 @@
                   <a:schemeClr val="accent1"/>
                 </a:solidFill>
               </a:rPr>
-              <a:t>Create Container</a:t>
+              <a:t>Register</a:t>
             </a:r>
           </a:p>
         </p:txBody>
@@ -7024,7 +7022,7 @@
           <p:cNvPr id="5" name="Content Placeholder 4" descr="A screenshot of a cell phone&#10;&#10;Description automatically generated">
             <a:extLst>
               <a:ext uri="{FF2B5EF4-FFF2-40B4-BE49-F238E27FC236}">
-                <a16:creationId xmlns:a16="http://schemas.microsoft.com/office/drawing/2014/main" id="{2E32A6DC-7E18-4233-B3F4-A4649E06244B}"/>
+                <a16:creationId xmlns:a16="http://schemas.microsoft.com/office/drawing/2014/main" id="{E04F101E-9CA6-4DAC-9997-EA0F0B34299A}"/>
               </a:ext>
             </a:extLst>
           </p:cNvPr>
@@ -7043,15 +7041,15 @@
         </p:blipFill>
         <p:spPr>
           <a:xfrm>
-            <a:off x="729465" y="1600201"/>
-            <a:ext cx="6997731" cy="4173876"/>
+            <a:off x="354459" y="1394745"/>
+            <a:ext cx="8229600" cy="4173847"/>
           </a:xfrm>
         </p:spPr>
       </p:pic>
     </p:spTree>
     <p:extLst>
       <p:ext uri="{BB962C8B-B14F-4D97-AF65-F5344CB8AC3E}">
-        <p14:creationId xmlns:p14="http://schemas.microsoft.com/office/powerpoint/2010/main" val="3204260880"/>
+        <p14:creationId xmlns:p14="http://schemas.microsoft.com/office/powerpoint/2010/main" val="2732302873"/>
       </p:ext>
     </p:extLst>
   </p:cSld>
@@ -7094,12 +7092,7 @@
             <p:ph type="title"/>
           </p:nvPr>
         </p:nvSpPr>
-        <p:spPr>
-          <a:xfrm>
-            <a:off x="457200" y="274638"/>
-            <a:ext cx="8229600" cy="1143000"/>
-          </a:xfrm>
-        </p:spPr>
+        <p:spPr/>
         <p:txBody>
           <a:bodyPr/>
           <a:lstStyle/>
@@ -7110,122 +7103,38 @@
                   <a:schemeClr val="accent1"/>
                 </a:solidFill>
               </a:rPr>
-              <a:t>Project Demo</a:t>
-            </a:r>
-          </a:p>
-        </p:txBody>
-      </p:sp>
-      <p:sp>
-        <p:nvSpPr>
-          <p:cNvPr id="4" name="Content Placeholder 3">
+              <a:t>Login</a:t>
+            </a:r>
+          </a:p>
+        </p:txBody>
+      </p:sp>
+      <p:pic>
+        <p:nvPicPr>
+          <p:cNvPr id="5" name="Content Placeholder 4" descr="A screenshot of a cell phone&#10;&#10;Description automatically generated">
             <a:extLst>
               <a:ext uri="{FF2B5EF4-FFF2-40B4-BE49-F238E27FC236}">
-                <a16:creationId xmlns:a16="http://schemas.microsoft.com/office/drawing/2014/main" id="{913556E8-F82F-4735-A13A-A9F0B814B57C}"/>
-              </a:ext>
-            </a:extLst>
-          </p:cNvPr>
-          <p:cNvSpPr>
-            <a:spLocks noGrp="1"/>
-          </p:cNvSpPr>
-          <p:nvPr>
-            <p:ph idx="1"/>
-          </p:nvPr>
-        </p:nvSpPr>
-        <p:spPr>
-          <a:xfrm>
-            <a:off x="457200" y="1600200"/>
-            <a:ext cx="8229600" cy="4525963"/>
-          </a:xfrm>
-        </p:spPr>
-        <p:txBody>
-          <a:bodyPr>
-            <a:normAutofit fontScale="92500" lnSpcReduction="10000"/>
-          </a:bodyPr>
-          <a:lstStyle/>
-          <a:p>
-            <a:pPr marL="0" indent="0">
-              <a:buNone/>
-            </a:pPr>
-            <a:endParaRPr lang="en-US" dirty="0"/>
-          </a:p>
-          <a:p>
-            <a:pPr marL="0" indent="0">
-              <a:buNone/>
-            </a:pPr>
-            <a:endParaRPr lang="en-US" dirty="0"/>
-          </a:p>
-          <a:p>
-            <a:pPr marL="0" indent="0">
-              <a:buNone/>
-            </a:pPr>
-            <a:endParaRPr lang="en-US" dirty="0"/>
-          </a:p>
-          <a:p>
-            <a:pPr marL="0" indent="0">
-              <a:buNone/>
-            </a:pPr>
-            <a:endParaRPr lang="en-US" dirty="0"/>
-          </a:p>
-          <a:p>
-            <a:pPr marL="0" indent="0">
-              <a:buNone/>
-            </a:pPr>
-            <a:endParaRPr lang="en-US" dirty="0"/>
-          </a:p>
-          <a:p>
-            <a:pPr marL="0" indent="0">
-              <a:buNone/>
-            </a:pPr>
-            <a:endParaRPr lang="en-US" dirty="0"/>
-          </a:p>
-          <a:p>
-            <a:pPr marL="0" indent="0">
-              <a:buNone/>
-            </a:pPr>
-            <a:endParaRPr lang="en-US" dirty="0"/>
-          </a:p>
-          <a:p>
-            <a:pPr marL="0" indent="0">
-              <a:buNone/>
-            </a:pPr>
-            <a:r>
-              <a:rPr lang="en-US" dirty="0">
-                <a:hlinkClick r:id="rId2"/>
-              </a:rPr>
-              <a:t>https://www.youtube.com/watch?v=rU-d7t5pJK4&amp;feature=youtu.be</a:t>
-            </a:r>
-            <a:endParaRPr lang="en-US" dirty="0"/>
-          </a:p>
-        </p:txBody>
-      </p:sp>
-      <p:pic>
-        <p:nvPicPr>
-          <p:cNvPr id="7" name="Picture 6" descr="A picture containing drawing&#10;&#10;Description automatically generated">
-            <a:extLst>
-              <a:ext uri="{FF2B5EF4-FFF2-40B4-BE49-F238E27FC236}">
-                <a16:creationId xmlns:a16="http://schemas.microsoft.com/office/drawing/2014/main" id="{E0783E5F-9FBB-41D4-BB81-11C28F25825B}"/>
+                <a16:creationId xmlns:a16="http://schemas.microsoft.com/office/drawing/2014/main" id="{D2206EA5-9BD8-4AA5-AA57-C874DF3350C7}"/>
               </a:ext>
             </a:extLst>
           </p:cNvPr>
           <p:cNvPicPr>
-            <a:picLocks noChangeAspect="1"/>
+            <a:picLocks noGrp="1" noChangeAspect="1"/>
           </p:cNvPicPr>
-          <p:nvPr/>
+          <p:nvPr>
+            <p:ph idx="1"/>
+          </p:nvPr>
         </p:nvPicPr>
         <p:blipFill>
-          <a:blip r:embed="rId3"/>
+          <a:blip r:embed="rId2"/>
           <a:stretch>
             <a:fillRect/>
           </a:stretch>
         </p:blipFill>
         <p:spPr>
           <a:xfrm>
-            <a:off x="457200" y="1471579"/>
-            <a:ext cx="6447034" cy="3760536"/>
+            <a:off x="261991" y="1430611"/>
+            <a:ext cx="8229600" cy="4063365"/>
           </a:xfrm>
-          <a:prstGeom prst="rect">
-            <a:avLst/>
-          </a:prstGeom>
         </p:spPr>
       </p:pic>
     </p:spTree>
@@ -7263,7 +7172,7 @@
           <p:cNvPr id="2" name="Title 1">
             <a:extLst>
               <a:ext uri="{FF2B5EF4-FFF2-40B4-BE49-F238E27FC236}">
-                <a16:creationId xmlns:a16="http://schemas.microsoft.com/office/drawing/2014/main" id="{1345ACD0-E4E6-47A0-A0F8-579993F472A3}"/>
+                <a16:creationId xmlns:a16="http://schemas.microsoft.com/office/drawing/2014/main" id="{2F7B0CA2-D188-47A4-A43F-43358C5BB4E9}"/>
               </a:ext>
             </a:extLst>
           </p:cNvPr>
@@ -7285,52 +7194,44 @@
                   <a:schemeClr val="accent1"/>
                 </a:solidFill>
               </a:rPr>
-              <a:t>Future Enhancements</a:t>
-            </a:r>
-          </a:p>
-        </p:txBody>
-      </p:sp>
-      <p:sp>
-        <p:nvSpPr>
-          <p:cNvPr id="3" name="Content Placeholder 2">
+              <a:t>GET Docker REST API</a:t>
+            </a:r>
+          </a:p>
+        </p:txBody>
+      </p:sp>
+      <p:pic>
+        <p:nvPicPr>
+          <p:cNvPr id="5" name="Content Placeholder 4" descr="A screenshot of a social media post&#10;&#10;Description automatically generated">
             <a:extLst>
               <a:ext uri="{FF2B5EF4-FFF2-40B4-BE49-F238E27FC236}">
-                <a16:creationId xmlns:a16="http://schemas.microsoft.com/office/drawing/2014/main" id="{212ADEDD-46AE-470F-B736-A6DBDCA721CD}"/>
+                <a16:creationId xmlns:a16="http://schemas.microsoft.com/office/drawing/2014/main" id="{5D36565F-E5CE-4DC5-BF6F-083A1BBDF58A}"/>
               </a:ext>
             </a:extLst>
           </p:cNvPr>
-          <p:cNvSpPr>
-            <a:spLocks noGrp="1"/>
-          </p:cNvSpPr>
+          <p:cNvPicPr>
+            <a:picLocks noGrp="1" noChangeAspect="1"/>
+          </p:cNvPicPr>
           <p:nvPr>
             <p:ph idx="1"/>
           </p:nvPr>
-        </p:nvSpPr>
-        <p:spPr/>
-        <p:txBody>
-          <a:bodyPr/>
-          <a:lstStyle/>
-          <a:p>
-            <a:r>
-              <a:rPr lang="en-US" dirty="0"/>
-              <a:t>User billing according to the usage of the resources.</a:t>
-            </a:r>
-          </a:p>
-          <a:p>
-            <a:r>
-              <a:rPr lang="en-US" dirty="0"/>
-              <a:t>Providing other services apart from Nginx and MongoDB.</a:t>
-            </a:r>
-          </a:p>
-          <a:p>
-            <a:endParaRPr lang="en-US" dirty="0"/>
-          </a:p>
-        </p:txBody>
-      </p:sp>
+        </p:nvPicPr>
+        <p:blipFill>
+          <a:blip r:embed="rId2"/>
+          <a:stretch>
+            <a:fillRect/>
+          </a:stretch>
+        </p:blipFill>
+        <p:spPr>
+          <a:xfrm>
+            <a:off x="489959" y="1291976"/>
+            <a:ext cx="8164082" cy="4525963"/>
+          </a:xfrm>
+        </p:spPr>
+      </p:pic>
     </p:spTree>
     <p:extLst>
       <p:ext uri="{BB962C8B-B14F-4D97-AF65-F5344CB8AC3E}">
-        <p14:creationId xmlns:p14="http://schemas.microsoft.com/office/powerpoint/2010/main" val="4038466249"/>
+        <p14:creationId xmlns:p14="http://schemas.microsoft.com/office/powerpoint/2010/main" val="2012547908"/>
       </p:ext>
     </p:extLst>
   </p:cSld>
@@ -7341,239 +7242,6 @@
 </file>
 
 <file path=ppt/slides/slide14.xml><?xml version="1.0" encoding="utf-8"?>
-<p:sld xmlns:a="http://schemas.openxmlformats.org/drawingml/2006/main" xmlns:r="http://schemas.openxmlformats.org/officeDocument/2006/relationships" xmlns:p="http://schemas.openxmlformats.org/presentationml/2006/main">
-  <p:cSld>
-    <p:spTree>
-      <p:nvGrpSpPr>
-        <p:cNvPr id="1" name=""/>
-        <p:cNvGrpSpPr/>
-        <p:nvPr/>
-      </p:nvGrpSpPr>
-      <p:grpSpPr>
-        <a:xfrm>
-          <a:off x="0" y="0"/>
-          <a:ext cx="0" cy="0"/>
-          <a:chOff x="0" y="0"/>
-          <a:chExt cx="0" cy="0"/>
-        </a:xfrm>
-      </p:grpSpPr>
-      <p:sp>
-        <p:nvSpPr>
-          <p:cNvPr id="2" name="Title 1">
-            <a:extLst>
-              <a:ext uri="{FF2B5EF4-FFF2-40B4-BE49-F238E27FC236}">
-                <a16:creationId xmlns:a16="http://schemas.microsoft.com/office/drawing/2014/main" id="{E9009DB7-BD89-4D68-A82B-3729ED020855}"/>
-              </a:ext>
-            </a:extLst>
-          </p:cNvPr>
-          <p:cNvSpPr>
-            <a:spLocks noGrp="1"/>
-          </p:cNvSpPr>
-          <p:nvPr>
-            <p:ph type="title"/>
-          </p:nvPr>
-        </p:nvSpPr>
-        <p:spPr/>
-        <p:txBody>
-          <a:bodyPr/>
-          <a:lstStyle/>
-          <a:p>
-            <a:r>
-              <a:rPr lang="en-US" dirty="0">
-                <a:solidFill>
-                  <a:schemeClr val="accent1"/>
-                </a:solidFill>
-              </a:rPr>
-              <a:t>Issues Faced</a:t>
-            </a:r>
-          </a:p>
-        </p:txBody>
-      </p:sp>
-      <p:sp>
-        <p:nvSpPr>
-          <p:cNvPr id="3" name="Content Placeholder 2">
-            <a:extLst>
-              <a:ext uri="{FF2B5EF4-FFF2-40B4-BE49-F238E27FC236}">
-                <a16:creationId xmlns:a16="http://schemas.microsoft.com/office/drawing/2014/main" id="{C77F62CD-0ABB-44BC-995F-0AFDD3A4FB0B}"/>
-              </a:ext>
-            </a:extLst>
-          </p:cNvPr>
-          <p:cNvSpPr>
-            <a:spLocks noGrp="1"/>
-          </p:cNvSpPr>
-          <p:nvPr>
-            <p:ph idx="1"/>
-          </p:nvPr>
-        </p:nvSpPr>
-        <p:spPr/>
-        <p:txBody>
-          <a:bodyPr/>
-          <a:lstStyle/>
-          <a:p>
-            <a:r>
-              <a:rPr lang="en-US" dirty="0"/>
-              <a:t>Container Orchestration using Docker Swarm.</a:t>
-            </a:r>
-          </a:p>
-          <a:p>
-            <a:r>
-              <a:rPr lang="en-US" dirty="0"/>
-              <a:t>Working with Docker Rest API calls.</a:t>
-            </a:r>
-          </a:p>
-          <a:p>
-            <a:pPr marL="0" indent="0">
-              <a:buNone/>
-            </a:pPr>
-            <a:endParaRPr lang="en-US" dirty="0"/>
-          </a:p>
-          <a:p>
-            <a:endParaRPr lang="en-US" dirty="0"/>
-          </a:p>
-        </p:txBody>
-      </p:sp>
-    </p:spTree>
-    <p:extLst>
-      <p:ext uri="{BB962C8B-B14F-4D97-AF65-F5344CB8AC3E}">
-        <p14:creationId xmlns:p14="http://schemas.microsoft.com/office/powerpoint/2010/main" val="2045425085"/>
-      </p:ext>
-    </p:extLst>
-  </p:cSld>
-  <p:clrMapOvr>
-    <a:masterClrMapping/>
-  </p:clrMapOvr>
-</p:sld>
-</file>
-
-<file path=ppt/slides/slide15.xml><?xml version="1.0" encoding="utf-8"?>
-<p:sld xmlns:a="http://schemas.openxmlformats.org/drawingml/2006/main" xmlns:r="http://schemas.openxmlformats.org/officeDocument/2006/relationships" xmlns:p="http://schemas.openxmlformats.org/presentationml/2006/main">
-  <p:cSld>
-    <p:spTree>
-      <p:nvGrpSpPr>
-        <p:cNvPr id="1" name=""/>
-        <p:cNvGrpSpPr/>
-        <p:nvPr/>
-      </p:nvGrpSpPr>
-      <p:grpSpPr>
-        <a:xfrm>
-          <a:off x="0" y="0"/>
-          <a:ext cx="0" cy="0"/>
-          <a:chOff x="0" y="0"/>
-          <a:chExt cx="0" cy="0"/>
-        </a:xfrm>
-      </p:grpSpPr>
-      <p:sp>
-        <p:nvSpPr>
-          <p:cNvPr id="2" name="Title 1">
-            <a:extLst>
-              <a:ext uri="{FF2B5EF4-FFF2-40B4-BE49-F238E27FC236}">
-                <a16:creationId xmlns:a16="http://schemas.microsoft.com/office/drawing/2014/main" id="{4418CC17-C876-48AC-A9F1-66F3DA1776CC}"/>
-              </a:ext>
-            </a:extLst>
-          </p:cNvPr>
-          <p:cNvSpPr>
-            <a:spLocks noGrp="1"/>
-          </p:cNvSpPr>
-          <p:nvPr>
-            <p:ph type="title"/>
-          </p:nvPr>
-        </p:nvSpPr>
-        <p:spPr>
-          <a:xfrm>
-            <a:off x="457200" y="243815"/>
-            <a:ext cx="8229600" cy="1143000"/>
-          </a:xfrm>
-        </p:spPr>
-        <p:txBody>
-          <a:bodyPr/>
-          <a:lstStyle/>
-          <a:p>
-            <a:r>
-              <a:rPr lang="en-US" dirty="0">
-                <a:solidFill>
-                  <a:schemeClr val="accent1"/>
-                </a:solidFill>
-              </a:rPr>
-              <a:t>References</a:t>
-            </a:r>
-          </a:p>
-        </p:txBody>
-      </p:sp>
-      <p:sp>
-        <p:nvSpPr>
-          <p:cNvPr id="3" name="Content Placeholder 2">
-            <a:extLst>
-              <a:ext uri="{FF2B5EF4-FFF2-40B4-BE49-F238E27FC236}">
-                <a16:creationId xmlns:a16="http://schemas.microsoft.com/office/drawing/2014/main" id="{A7536B9A-B19B-4C2F-91A0-69EA2274BF9C}"/>
-              </a:ext>
-            </a:extLst>
-          </p:cNvPr>
-          <p:cNvSpPr>
-            <a:spLocks noGrp="1"/>
-          </p:cNvSpPr>
-          <p:nvPr>
-            <p:ph idx="1"/>
-          </p:nvPr>
-        </p:nvSpPr>
-        <p:spPr/>
-        <p:txBody>
-          <a:bodyPr/>
-          <a:lstStyle/>
-          <a:p>
-            <a:r>
-              <a:rPr lang="en-US" dirty="0">
-                <a:hlinkClick r:id="rId2"/>
-              </a:rPr>
-              <a:t>https://docs.docker.com/engine/api/v1.24/</a:t>
-            </a:r>
-            <a:endParaRPr lang="en-US" dirty="0"/>
-          </a:p>
-          <a:p>
-            <a:r>
-              <a:rPr lang="en-US" dirty="0">
-                <a:hlinkClick r:id="rId3"/>
-              </a:rPr>
-              <a:t>https://docs.docker.com/engine/swarm/swarm-tutorial/create-swarm/</a:t>
-            </a:r>
-            <a:endParaRPr lang="en-US" dirty="0"/>
-          </a:p>
-          <a:p>
-            <a:r>
-              <a:rPr lang="en-US" dirty="0">
-                <a:hlinkClick r:id="rId4"/>
-              </a:rPr>
-              <a:t>https://www.thepolyglotdeveloper.com/2019/01/getting-started-mongodb-docker-container-deployment/</a:t>
-            </a:r>
-            <a:endParaRPr lang="en-US" dirty="0"/>
-          </a:p>
-          <a:p>
-            <a:r>
-              <a:rPr lang="en-US" dirty="0">
-                <a:hlinkClick r:id="rId5"/>
-              </a:rPr>
-              <a:t>http://www.mongoing.com/docs/reference/method/js-collection.html</a:t>
-            </a:r>
-            <a:endParaRPr lang="en-US" dirty="0"/>
-          </a:p>
-          <a:p>
-            <a:endParaRPr lang="en-US" dirty="0"/>
-          </a:p>
-        </p:txBody>
-      </p:sp>
-    </p:spTree>
-    <p:extLst>
-      <p:ext uri="{BB962C8B-B14F-4D97-AF65-F5344CB8AC3E}">
-        <p14:creationId xmlns:p14="http://schemas.microsoft.com/office/powerpoint/2010/main" val="3658464247"/>
-      </p:ext>
-    </p:extLst>
-  </p:cSld>
-  <p:clrMapOvr>
-    <a:masterClrMapping/>
-  </p:clrMapOvr>
-</p:sld>
-</file>
-
-<file path=ppt/slides/slide16.xml><?xml version="1.0" encoding="utf-8"?>
 <p:sld xmlns:a="http://schemas.openxmlformats.org/drawingml/2006/main" xmlns:r="http://schemas.openxmlformats.org/officeDocument/2006/relationships" xmlns:p="http://schemas.openxmlformats.org/presentationml/2006/main">
   <p:cSld>
     <p:spTree>
@@ -8007,8 +7675,13 @@
             </a:pPr>
             <a:r>
               <a:rPr lang="en-US" dirty="0"/>
-              <a:t>Net Beans IDE, Postman</a:t>
-            </a:r>
+              <a:t>Net Beans </a:t>
+            </a:r>
+            <a:r>
+              <a:rPr lang="en-US" dirty="0" err="1"/>
+              <a:t>IDE,PostMan</a:t>
+            </a:r>
+            <a:endParaRPr lang="en-US" dirty="0"/>
           </a:p>
         </p:txBody>
       </p:sp>
@@ -8922,12 +8595,7 @@
             <p:ph idx="1"/>
           </p:nvPr>
         </p:nvSpPr>
-        <p:spPr>
-          <a:xfrm>
-            <a:off x="457200" y="1217612"/>
-            <a:ext cx="8229600" cy="4525963"/>
-          </a:xfrm>
-        </p:spPr>
+        <p:spPr/>
         <p:txBody>
           <a:bodyPr/>
           <a:lstStyle/>
@@ -8938,10 +8606,10 @@
       </p:sp>
       <p:pic>
         <p:nvPicPr>
-          <p:cNvPr id="3" name="Picture 2">
+          <p:cNvPr id="7" name="Picture 6">
             <a:extLst>
               <a:ext uri="{FF2B5EF4-FFF2-40B4-BE49-F238E27FC236}">
-                <a16:creationId xmlns:a16="http://schemas.microsoft.com/office/drawing/2014/main" id="{5D14BD6C-9259-4FF1-AAB7-FE15AC06B338}"/>
+                <a16:creationId xmlns:a16="http://schemas.microsoft.com/office/drawing/2014/main" id="{8EDB189C-A53F-41A5-8095-2A13C27EF7A6}"/>
               </a:ext>
             </a:extLst>
           </p:cNvPr>
@@ -8958,8 +8626,8 @@
         </p:blipFill>
         <p:spPr>
           <a:xfrm>
-            <a:off x="457200" y="1071081"/>
-            <a:ext cx="8306656" cy="4672494"/>
+            <a:off x="457200" y="1104953"/>
+            <a:ext cx="8399124" cy="4610041"/>
           </a:xfrm>
           <a:prstGeom prst="rect">
             <a:avLst/>

</xml_diff>